<commit_message>
MAJ Présentation semaine 1
</commit_message>
<xml_diff>
--- a/Gestion de projet/Présentation semaine 1.pptx
+++ b/Gestion de projet/Présentation semaine 1.pptx
@@ -271,7 +271,7 @@
           <a:p>
             <a:fld id="{F4D57BDD-E64A-4D27-8978-82FFCA18A12C}" type="datetimeFigureOut">
               <a:rPr lang="en-US" smtClean="0"/>
-              <a:t>9/8/2020</a:t>
+              <a:t>9/9/2020</a:t>
             </a:fld>
             <a:endParaRPr lang="en-US"/>
           </a:p>
@@ -480,7 +480,7 @@
           <a:p>
             <a:fld id="{F4D57BDD-E64A-4D27-8978-82FFCA18A12C}" type="datetimeFigureOut">
               <a:rPr lang="en-US" smtClean="0"/>
-              <a:t>9/8/2020</a:t>
+              <a:t>9/9/2020</a:t>
             </a:fld>
             <a:endParaRPr lang="en-US"/>
           </a:p>
@@ -688,7 +688,7 @@
           <a:p>
             <a:fld id="{F4D57BDD-E64A-4D27-8978-82FFCA18A12C}" type="datetimeFigureOut">
               <a:rPr lang="en-US" smtClean="0"/>
-              <a:t>9/8/2020</a:t>
+              <a:t>9/9/2020</a:t>
             </a:fld>
             <a:endParaRPr lang="en-US"/>
           </a:p>
@@ -886,7 +886,7 @@
           <a:p>
             <a:fld id="{F4D57BDD-E64A-4D27-8978-82FFCA18A12C}" type="datetimeFigureOut">
               <a:rPr lang="en-US" smtClean="0"/>
-              <a:t>9/8/2020</a:t>
+              <a:t>9/9/2020</a:t>
             </a:fld>
             <a:endParaRPr lang="en-US"/>
           </a:p>
@@ -1162,7 +1162,7 @@
           <a:p>
             <a:fld id="{F4D57BDD-E64A-4D27-8978-82FFCA18A12C}" type="datetimeFigureOut">
               <a:rPr lang="en-US" smtClean="0"/>
-              <a:t>9/8/2020</a:t>
+              <a:t>9/9/2020</a:t>
             </a:fld>
             <a:endParaRPr lang="en-US"/>
           </a:p>
@@ -1434,7 +1434,7 @@
           <a:p>
             <a:fld id="{F4D57BDD-E64A-4D27-8978-82FFCA18A12C}" type="datetimeFigureOut">
               <a:rPr lang="en-US" smtClean="0"/>
-              <a:t>9/8/2020</a:t>
+              <a:t>9/9/2020</a:t>
             </a:fld>
             <a:endParaRPr lang="en-US"/>
           </a:p>
@@ -1848,7 +1848,7 @@
           <a:p>
             <a:fld id="{F4D57BDD-E64A-4D27-8978-82FFCA18A12C}" type="datetimeFigureOut">
               <a:rPr lang="en-US" smtClean="0"/>
-              <a:t>9/8/2020</a:t>
+              <a:t>9/9/2020</a:t>
             </a:fld>
             <a:endParaRPr lang="en-US"/>
           </a:p>
@@ -1995,7 +1995,7 @@
           <a:p>
             <a:fld id="{F4D57BDD-E64A-4D27-8978-82FFCA18A12C}" type="datetimeFigureOut">
               <a:rPr lang="en-US" smtClean="0"/>
-              <a:t>9/8/2020</a:t>
+              <a:t>9/9/2020</a:t>
             </a:fld>
             <a:endParaRPr lang="en-US"/>
           </a:p>
@@ -2108,7 +2108,7 @@
           <a:p>
             <a:fld id="{F4D57BDD-E64A-4D27-8978-82FFCA18A12C}" type="datetimeFigureOut">
               <a:rPr lang="en-US" smtClean="0"/>
-              <a:t>9/8/2020</a:t>
+              <a:t>9/9/2020</a:t>
             </a:fld>
             <a:endParaRPr lang="en-US"/>
           </a:p>
@@ -2420,7 +2420,7 @@
           <a:p>
             <a:fld id="{F4D57BDD-E64A-4D27-8978-82FFCA18A12C}" type="datetimeFigureOut">
               <a:rPr lang="en-US" smtClean="0"/>
-              <a:t>9/8/2020</a:t>
+              <a:t>9/9/2020</a:t>
             </a:fld>
             <a:endParaRPr lang="en-US"/>
           </a:p>
@@ -2711,7 +2711,7 @@
           <a:p>
             <a:fld id="{F4D57BDD-E64A-4D27-8978-82FFCA18A12C}" type="datetimeFigureOut">
               <a:rPr lang="en-US" smtClean="0"/>
-              <a:t>9/8/2020</a:t>
+              <a:t>9/9/2020</a:t>
             </a:fld>
             <a:endParaRPr lang="en-US"/>
           </a:p>
@@ -2953,7 +2953,7 @@
             <a:fld id="{F4D57BDD-E64A-4D27-8978-82FFCA18A12C}" type="datetimeFigureOut">
               <a:rPr lang="en-US" smtClean="0"/>
               <a:pPr/>
-              <a:t>9/8/2020</a:t>
+              <a:t>9/9/2020</a:t>
             </a:fld>
             <a:endParaRPr lang="en-US" dirty="0"/>
           </a:p>
@@ -7714,8 +7714,8 @@
         </p:nvSpPr>
         <p:spPr>
           <a:xfrm>
-            <a:off x="3552824" y="3159118"/>
-            <a:ext cx="2228850" cy="2462213"/>
+            <a:off x="3629026" y="3805449"/>
+            <a:ext cx="2057401" cy="861774"/>
           </a:xfrm>
           <a:prstGeom prst="rect">
             <a:avLst/>
@@ -7735,7 +7735,7 @@
           <a:p>
             <a:r>
               <a:rPr lang="fr-FR" b="1" dirty="0"/>
-              <a:t>DATA ENGINEER, analyse les données et classe les informations recueillies en fonction des besoins</a:t>
+              <a:t>DATA WAREHOUSE </a:t>
             </a:r>
           </a:p>
           <a:p>
@@ -7744,13 +7744,7 @@
           <a:p>
             <a:r>
               <a:rPr lang="fr-FR" sz="1400" dirty="0"/>
-              <a:t>Pierre-Maxime COSTA </a:t>
-            </a:r>
-          </a:p>
-          <a:p>
-            <a:r>
-              <a:rPr lang="fr-FR" sz="1400" dirty="0"/>
-              <a:t>Edouard DANSETTE</a:t>
+              <a:t>Jules ROUSSEAU</a:t>
             </a:r>
           </a:p>
         </p:txBody>
@@ -7769,8 +7763,8 @@
         </p:nvSpPr>
         <p:spPr>
           <a:xfrm>
-            <a:off x="9329736" y="3133738"/>
-            <a:ext cx="2057401" cy="2462213"/>
+            <a:off x="9434511" y="3506181"/>
+            <a:ext cx="2057401" cy="1569660"/>
           </a:xfrm>
           <a:prstGeom prst="rect">
             <a:avLst/>
@@ -7790,22 +7784,22 @@
           <a:p>
             <a:r>
               <a:rPr lang="fr-FR" b="1" dirty="0"/>
-              <a:t>REPORTER, chargé de rédiger les rapports de nature technique</a:t>
+              <a:t>REPORTING et ANALYSE</a:t>
             </a:r>
           </a:p>
           <a:p>
             <a:endParaRPr lang="fr-FR" b="1" dirty="0"/>
           </a:p>
           <a:p>
-            <a:endParaRPr lang="fr-FR" b="1" dirty="0"/>
-          </a:p>
-          <a:p>
-            <a:endParaRPr lang="fr-FR" b="1" dirty="0"/>
-          </a:p>
-          <a:p>
             <a:r>
               <a:rPr lang="fr-FR" sz="1400" dirty="0"/>
-              <a:t>Nils CHARRIER</a:t>
+              <a:t>Pierre-Maxime COSTA </a:t>
+            </a:r>
+          </a:p>
+          <a:p>
+            <a:r>
+              <a:rPr lang="fr-FR" sz="1400" dirty="0"/>
+              <a:t>Edouard DANSETTE</a:t>
             </a:r>
           </a:p>
           <a:p>
@@ -7827,8 +7821,8 @@
         </p:nvSpPr>
         <p:spPr>
           <a:xfrm>
-            <a:off x="804863" y="3159118"/>
-            <a:ext cx="2166938" cy="2462213"/>
+            <a:off x="814388" y="3721625"/>
+            <a:ext cx="2166938" cy="1138773"/>
           </a:xfrm>
           <a:prstGeom prst="rect">
             <a:avLst/>
@@ -7848,7 +7842,7 @@
           <a:p>
             <a:r>
               <a:rPr lang="fr-FR" b="1" dirty="0"/>
-              <a:t>DATA MINER, choisit les données sources potentiellement exploitables, formate et nettoie les données</a:t>
+              <a:t>EXTRACTION DES DONNEES SOURCE</a:t>
             </a:r>
           </a:p>
           <a:p>
@@ -7857,11 +7851,8 @@
           <a:p>
             <a:r>
               <a:rPr lang="fr-FR" sz="1400" dirty="0"/>
-              <a:t>Jules ROUSSEAU</a:t>
-            </a:r>
-          </a:p>
-          <a:p>
-            <a:endParaRPr lang="fr-FR" sz="1400" dirty="0"/>
+              <a:t>Louis TINEL</a:t>
+            </a:r>
           </a:p>
         </p:txBody>
       </p:sp>
@@ -7879,8 +7870,8 @@
         </p:nvSpPr>
         <p:spPr>
           <a:xfrm>
-            <a:off x="6386512" y="3159118"/>
-            <a:ext cx="2362201" cy="2462213"/>
+            <a:off x="6479381" y="3697727"/>
+            <a:ext cx="2057401" cy="1077218"/>
           </a:xfrm>
           <a:prstGeom prst="rect">
             <a:avLst/>
@@ -7900,7 +7891,7 @@
           <a:p>
             <a:r>
               <a:rPr lang="fr-FR" b="1" dirty="0"/>
-              <a:t>MACHINE LEARNING ENGINEER, s’occupe de l’analyse prédictive, écrit des programmes et développe des algorithmes</a:t>
+              <a:t>DATAMART</a:t>
             </a:r>
           </a:p>
           <a:p>
@@ -7909,7 +7900,7 @@
           <a:p>
             <a:r>
               <a:rPr lang="fr-FR" sz="1400" dirty="0"/>
-              <a:t>Louis TINEL</a:t>
+              <a:t>Nils CHARRIER</a:t>
             </a:r>
           </a:p>
           <a:p>
@@ -8039,7 +8030,7 @@
         </p:nvSpPr>
         <p:spPr>
           <a:xfrm>
-            <a:off x="8877297" y="4143375"/>
+            <a:off x="8820147" y="4143375"/>
             <a:ext cx="371475" cy="295275"/>
           </a:xfrm>
           <a:prstGeom prst="rightArrow">

</xml_diff>